<commit_message>
move python kafka code here, and work on scenario 2
</commit_message>
<xml_diff>
--- a/docs/mm2-diagrams.pptx
+++ b/docs/mm2-diagrams.pptx
@@ -223,7 +223,7 @@
           <a:p>
             <a:fld id="{43B1B1F9-D0CB-FF4D-BEE0-BED1F1FDA196}" type="datetimeFigureOut">
               <a:rPr lang="en-US" smtClean="0"/>
-              <a:t>3/10/20</a:t>
+              <a:t>3/11/20</a:t>
             </a:fld>
             <a:endParaRPr lang="en-US"/>
           </a:p>
@@ -388,7 +388,7 @@
           <a:p>
             <a:fld id="{26BE012A-D992-5D42-B86E-AA2BC0764EE1}" type="datetimeFigureOut">
               <a:rPr lang="en-US" smtClean="0"/>
-              <a:t>3/10/20</a:t>
+              <a:t>3/11/20</a:t>
             </a:fld>
             <a:endParaRPr lang="en-US"/>
           </a:p>
@@ -2769,14 +2769,14 @@
           </a:ln>
           <a:extLst>
             <a:ext uri="{909E8E84-426E-40dd-AFC4-6F175D3DCCD1}">
-              <a14:hiddenFill xmlns="" xmlns:a14="http://schemas.microsoft.com/office/drawing/2010/main">
+              <a14:hiddenFill xmlns:a14="http://schemas.microsoft.com/office/drawing/2010/main" xmlns="">
                 <a:solidFill>
                   <a:srgbClr val="FFFFFF"/>
                 </a:solidFill>
               </a14:hiddenFill>
             </a:ext>
             <a:ext uri="{91240B29-F687-4f45-9708-019B960494DF}">
-              <a14:hiddenLine xmlns="" xmlns:a14="http://schemas.microsoft.com/office/drawing/2010/main" w="9525">
+              <a14:hiddenLine xmlns:a14="http://schemas.microsoft.com/office/drawing/2010/main" xmlns="" w="9525">
                 <a:solidFill>
                   <a:srgbClr val="000000"/>
                 </a:solidFill>
@@ -2828,14 +2828,14 @@
           <a:effectLst/>
           <a:extLst>
             <a:ext uri="{909E8E84-426E-40dd-AFC4-6F175D3DCCD1}">
-              <a14:hiddenFill xmlns="" xmlns:a14="http://schemas.microsoft.com/office/drawing/2010/main">
+              <a14:hiddenFill xmlns:a14="http://schemas.microsoft.com/office/drawing/2010/main" xmlns="">
                 <a:solidFill>
                   <a:schemeClr val="accent1"/>
                 </a:solidFill>
               </a14:hiddenFill>
             </a:ext>
             <a:ext uri="{91240B29-F687-4f45-9708-019B960494DF}">
-              <a14:hiddenLine xmlns="" xmlns:a14="http://schemas.microsoft.com/office/drawing/2010/main" w="9525">
+              <a14:hiddenLine xmlns:a14="http://schemas.microsoft.com/office/drawing/2010/main" xmlns="" w="9525">
                 <a:solidFill>
                   <a:schemeClr val="tx1"/>
                 </a:solidFill>
@@ -2845,7 +2845,7 @@
               </a14:hiddenLine>
             </a:ext>
             <a:ext uri="{AF507438-7753-43e0-B8FC-AC1667EBCBE1}">
-              <a14:hiddenEffects xmlns="" xmlns:a14="http://schemas.microsoft.com/office/drawing/2010/main">
+              <a14:hiddenEffects xmlns:a14="http://schemas.microsoft.com/office/drawing/2010/main" xmlns="">
                 <a:effectLst>
                   <a:outerShdw blurRad="63500" dist="38099" dir="2700000" algn="ctr" rotWithShape="0">
                     <a:schemeClr val="bg2">
@@ -3561,10 +3561,10 @@
           </a:ln>
           <a:extLst>
             <a:ext uri="{FAA26D3D-D897-4be2-8F04-BA451C77F1D7}">
-              <ma14:placeholderFlag xmlns:ma14="http://schemas.microsoft.com/office/mac/drawingml/2011/main" xmlns="" val="1"/>
+              <ma14:placeholderFlag xmlns="" xmlns:ma14="http://schemas.microsoft.com/office/mac/drawingml/2011/main" val="1"/>
             </a:ext>
             <a:ext uri="{909E8E84-426E-40dd-AFC4-6F175D3DCCD1}">
-              <a14:hiddenFill xmlns:a14="http://schemas.microsoft.com/office/drawing/2010/main" xmlns="">
+              <a14:hiddenFill xmlns="" xmlns:a14="http://schemas.microsoft.com/office/drawing/2010/main">
                 <a:solidFill>
                   <a:srgbClr val="FFFFFF"/>
                 </a:solidFill>
@@ -3615,10 +3615,10 @@
           </a:ln>
           <a:extLst>
             <a:ext uri="{FAA26D3D-D897-4be2-8F04-BA451C77F1D7}">
-              <ma14:placeholderFlag xmlns:ma14="http://schemas.microsoft.com/office/mac/drawingml/2011/main" xmlns="" val="1"/>
+              <ma14:placeholderFlag xmlns="" xmlns:ma14="http://schemas.microsoft.com/office/mac/drawingml/2011/main" val="1"/>
             </a:ext>
             <a:ext uri="{909E8E84-426E-40dd-AFC4-6F175D3DCCD1}">
-              <a14:hiddenFill xmlns:a14="http://schemas.microsoft.com/office/drawing/2010/main" xmlns="">
+              <a14:hiddenFill xmlns="" xmlns:a14="http://schemas.microsoft.com/office/drawing/2010/main">
                 <a:solidFill>
                   <a:srgbClr val="FFFFFF"/>
                 </a:solidFill>
@@ -14690,36 +14690,6 @@
           </a:prstGeom>
         </p:spPr>
       </p:pic>
-      <p:pic>
-        <p:nvPicPr>
-          <p:cNvPr id="37" name="Picture 36">
-            <a:extLst>
-              <a:ext uri="{FF2B5EF4-FFF2-40B4-BE49-F238E27FC236}">
-                <a16:creationId xmlns:a16="http://schemas.microsoft.com/office/drawing/2014/main" id="{6D8F6862-7739-D946-A521-B5976D86EED8}"/>
-              </a:ext>
-            </a:extLst>
-          </p:cNvPr>
-          <p:cNvPicPr>
-            <a:picLocks noChangeAspect="1"/>
-          </p:cNvPicPr>
-          <p:nvPr/>
-        </p:nvPicPr>
-        <p:blipFill>
-          <a:blip r:embed="rId4"/>
-          <a:stretch>
-            <a:fillRect/>
-          </a:stretch>
-        </p:blipFill>
-        <p:spPr>
-          <a:xfrm>
-            <a:off x="1956920" y="2941013"/>
-            <a:ext cx="376238" cy="371475"/>
-          </a:xfrm>
-          <a:prstGeom prst="rect">
-            <a:avLst/>
-          </a:prstGeom>
-        </p:spPr>
-      </p:pic>
       <p:sp>
         <p:nvSpPr>
           <p:cNvPr id="54" name="Rounded Rectangle 53">
@@ -16108,6 +16078,78 @@
           </a:fontRef>
         </p:style>
       </p:cxnSp>
+      <p:sp>
+        <p:nvSpPr>
+          <p:cNvPr id="72" name="TextBox 71">
+            <a:extLst>
+              <a:ext uri="{FF2B5EF4-FFF2-40B4-BE49-F238E27FC236}">
+                <a16:creationId xmlns:a16="http://schemas.microsoft.com/office/drawing/2014/main" id="{0EBAAD39-80D0-5549-8180-F3A0C0565822}"/>
+              </a:ext>
+            </a:extLst>
+          </p:cNvPr>
+          <p:cNvSpPr txBox="1"/>
+          <p:nvPr/>
+        </p:nvSpPr>
+        <p:spPr>
+          <a:xfrm>
+            <a:off x="1258848" y="1463746"/>
+            <a:ext cx="673582" cy="246221"/>
+          </a:xfrm>
+          <a:prstGeom prst="rect">
+            <a:avLst/>
+          </a:prstGeom>
+          <a:noFill/>
+        </p:spPr>
+        <p:txBody>
+          <a:bodyPr wrap="none" rtlCol="0">
+            <a:spAutoFit/>
+          </a:bodyPr>
+          <a:lstStyle/>
+          <a:p>
+            <a:r>
+              <a:rPr lang="en-US" sz="1000" dirty="0"/>
+              <a:t>products</a:t>
+            </a:r>
+            <a:endParaRPr sz="1000" dirty="0"/>
+          </a:p>
+        </p:txBody>
+      </p:sp>
+      <p:sp>
+        <p:nvSpPr>
+          <p:cNvPr id="73" name="TextBox 72">
+            <a:extLst>
+              <a:ext uri="{FF2B5EF4-FFF2-40B4-BE49-F238E27FC236}">
+                <a16:creationId xmlns:a16="http://schemas.microsoft.com/office/drawing/2014/main" id="{78E8CCC5-9C76-5345-BDCB-1F1DD5A80BA4}"/>
+              </a:ext>
+            </a:extLst>
+          </p:cNvPr>
+          <p:cNvSpPr txBox="1"/>
+          <p:nvPr/>
+        </p:nvSpPr>
+        <p:spPr>
+          <a:xfrm>
+            <a:off x="6329859" y="1423157"/>
+            <a:ext cx="1091966" cy="246221"/>
+          </a:xfrm>
+          <a:prstGeom prst="rect">
+            <a:avLst/>
+          </a:prstGeom>
+          <a:noFill/>
+        </p:spPr>
+        <p:txBody>
+          <a:bodyPr wrap="none" rtlCol="0">
+            <a:spAutoFit/>
+          </a:bodyPr>
+          <a:lstStyle/>
+          <a:p>
+            <a:r>
+              <a:rPr lang="en-US" sz="1000" dirty="0"/>
+              <a:t>source.products</a:t>
+            </a:r>
+            <a:endParaRPr sz="1000" dirty="0"/>
+          </a:p>
+        </p:txBody>
+      </p:sp>
     </p:spTree>
     <p:extLst>
       <p:ext uri="{BB962C8B-B14F-4D97-AF65-F5344CB8AC3E}">
@@ -18621,6 +18663,9 @@
             <a:chOff x="4142228" y="2170290"/>
             <a:chExt cx="734098" cy="548634"/>
           </a:xfrm>
+          <a:solidFill>
+            <a:schemeClr val="accent2"/>
+          </a:solidFill>
         </p:grpSpPr>
         <p:sp>
           <p:nvSpPr>
@@ -18642,12 +18687,7 @@
             <a:prstGeom prst="roundRect">
               <a:avLst/>
             </a:prstGeom>
-            <a:solidFill>
-              <a:schemeClr val="accent5">
-                <a:lumMod val="60000"/>
-                <a:lumOff val="40000"/>
-              </a:schemeClr>
-            </a:solidFill>
+            <a:grpFill/>
             <a:ln>
               <a:solidFill>
                 <a:schemeClr val="bg1"/>
@@ -18730,12 +18770,7 @@
             <a:prstGeom prst="roundRect">
               <a:avLst/>
             </a:prstGeom>
-            <a:solidFill>
-              <a:schemeClr val="accent5">
-                <a:lumMod val="60000"/>
-                <a:lumOff val="40000"/>
-              </a:schemeClr>
-            </a:solidFill>
+            <a:grpFill/>
             <a:ln>
               <a:solidFill>
                 <a:schemeClr val="bg1"/>
@@ -18818,12 +18853,7 @@
             <a:prstGeom prst="roundRect">
               <a:avLst/>
             </a:prstGeom>
-            <a:solidFill>
-              <a:schemeClr val="accent5">
-                <a:lumMod val="60000"/>
-                <a:lumOff val="40000"/>
-              </a:schemeClr>
-            </a:solidFill>
+            <a:grpFill/>
             <a:ln>
               <a:solidFill>
                 <a:schemeClr val="bg1"/>
@@ -18906,12 +18936,7 @@
             <a:prstGeom prst="roundRect">
               <a:avLst/>
             </a:prstGeom>
-            <a:solidFill>
-              <a:schemeClr val="accent5">
-                <a:lumMod val="60000"/>
-                <a:lumOff val="40000"/>
-              </a:schemeClr>
-            </a:solidFill>
+            <a:grpFill/>
             <a:ln>
               <a:solidFill>
                 <a:schemeClr val="bg1"/>
@@ -18994,6 +19019,9 @@
             <a:chOff x="4142228" y="2170290"/>
             <a:chExt cx="734098" cy="548634"/>
           </a:xfrm>
+          <a:solidFill>
+            <a:schemeClr val="accent2"/>
+          </a:solidFill>
         </p:grpSpPr>
         <p:sp>
           <p:nvSpPr>
@@ -19015,12 +19043,7 @@
             <a:prstGeom prst="roundRect">
               <a:avLst/>
             </a:prstGeom>
-            <a:solidFill>
-              <a:schemeClr val="accent5">
-                <a:lumMod val="60000"/>
-                <a:lumOff val="40000"/>
-              </a:schemeClr>
-            </a:solidFill>
+            <a:grpFill/>
             <a:ln>
               <a:solidFill>
                 <a:schemeClr val="bg1"/>
@@ -19103,12 +19126,7 @@
             <a:prstGeom prst="roundRect">
               <a:avLst/>
             </a:prstGeom>
-            <a:solidFill>
-              <a:schemeClr val="accent5">
-                <a:lumMod val="60000"/>
-                <a:lumOff val="40000"/>
-              </a:schemeClr>
-            </a:solidFill>
+            <a:grpFill/>
             <a:ln>
               <a:solidFill>
                 <a:schemeClr val="bg1"/>
@@ -19191,12 +19209,7 @@
             <a:prstGeom prst="roundRect">
               <a:avLst/>
             </a:prstGeom>
-            <a:solidFill>
-              <a:schemeClr val="accent5">
-                <a:lumMod val="60000"/>
-                <a:lumOff val="40000"/>
-              </a:schemeClr>
-            </a:solidFill>
+            <a:grpFill/>
             <a:ln>
               <a:solidFill>
                 <a:schemeClr val="bg1"/>
@@ -19279,12 +19292,7 @@
             <a:prstGeom prst="roundRect">
               <a:avLst/>
             </a:prstGeom>
-            <a:solidFill>
-              <a:schemeClr val="accent5">
-                <a:lumMod val="60000"/>
-                <a:lumOff val="40000"/>
-              </a:schemeClr>
-            </a:solidFill>
+            <a:grpFill/>
             <a:ln>
               <a:solidFill>
                 <a:schemeClr val="bg1"/>
@@ -20636,8 +20644,8 @@
         </p:nvSpPr>
         <p:spPr>
           <a:xfrm rot="16200000">
-            <a:off x="6934301" y="2441440"/>
-            <a:ext cx="309314" cy="1137314"/>
+            <a:off x="7022901" y="2352839"/>
+            <a:ext cx="309314" cy="1314515"/>
           </a:xfrm>
           <a:prstGeom prst="can">
             <a:avLst/>
@@ -20683,7 +20691,7 @@
               </a:spcAft>
             </a:pPr>
             <a:r>
-              <a:rPr lang="en-US" sz="1000" b="1" err="1">
+              <a:rPr lang="en-US" sz="1000" b="1" dirty="0">
                 <a:solidFill>
                   <a:schemeClr val="accent4">
                     <a:lumMod val="75000"/>
@@ -20691,16 +20699,8 @@
                 </a:solidFill>
                 <a:latin typeface="Arial"/>
               </a:rPr>
-              <a:t>source.orders</a:t>
-            </a:r>
-            <a:endParaRPr lang="en-US" sz="1000" b="1">
-              <a:solidFill>
-                <a:schemeClr val="accent4">
-                  <a:lumMod val="75000"/>
-                </a:schemeClr>
-              </a:solidFill>
-              <a:latin typeface="Arial"/>
-            </a:endParaRPr>
+              <a:t>source.products</a:t>
+            </a:r>
           </a:p>
         </p:txBody>
       </p:sp>
@@ -21204,7 +21204,7 @@
               </a:spcAft>
             </a:pPr>
             <a:r>
-              <a:rPr lang="en-US" sz="1000" b="1">
+              <a:rPr lang="en-US" sz="1000" b="1" dirty="0">
                 <a:solidFill>
                   <a:schemeClr val="accent4">
                     <a:lumMod val="75000"/>
@@ -21212,7 +21212,7 @@
                 </a:solidFill>
                 <a:latin typeface="Arial"/>
               </a:rPr>
-              <a:t>Orders</a:t>
+              <a:t>products</a:t>
             </a:r>
           </a:p>
         </p:txBody>
@@ -23887,10 +23887,9 @@
           <a:lstStyle/>
           <a:p>
             <a:r>
-              <a:rPr lang="en-US" sz="750" b="1" dirty="0" err="1"/>
+              <a:rPr lang="en-US" sz="750" b="1" dirty="0"/>
               <a:t>source.orders</a:t>
             </a:r>
-            <a:endParaRPr lang="en-US" sz="750" b="1" dirty="0"/>
           </a:p>
         </p:txBody>
       </p:sp>
@@ -26256,10 +26255,9 @@
           <a:lstStyle/>
           <a:p>
             <a:r>
-              <a:rPr lang="en-US" sz="750" b="1" dirty="0" err="1"/>
+              <a:rPr lang="en-US" sz="750" b="1" dirty="0"/>
               <a:t>source.orders</a:t>
             </a:r>
-            <a:endParaRPr lang="en-US" sz="750" b="1" dirty="0"/>
           </a:p>
         </p:txBody>
       </p:sp>

</xml_diff>